<commit_message>
Update presentations to reflect changes in GitHub
</commit_message>
<xml_diff>
--- a/Thunder_the_Robot.pptx
+++ b/Thunder_the_Robot.pptx
@@ -6,10 +6,10 @@
   </p:sldMasterIdLst>
   <p:sldIdLst>
     <p:sldId id="256" r:id="rId2"/>
-    <p:sldId id="257" r:id="rId3"/>
-    <p:sldId id="258" r:id="rId4"/>
-    <p:sldId id="259" r:id="rId5"/>
-    <p:sldId id="261" r:id="rId6"/>
+    <p:sldId id="261" r:id="rId3"/>
+    <p:sldId id="257" r:id="rId4"/>
+    <p:sldId id="258" r:id="rId5"/>
+    <p:sldId id="259" r:id="rId6"/>
     <p:sldId id="262" r:id="rId7"/>
     <p:sldId id="263" r:id="rId8"/>
     <p:sldId id="264" r:id="rId9"/>
@@ -522,7 +522,7 @@
           <a:p>
             <a:fld id="{4509A250-FF31-4206-8172-F9D3106AACB1}" type="datetimeFigureOut">
               <a:rPr lang="en-US" smtClean="0"/>
-              <a:t>5/24/2017</a:t>
+              <a:t>6/4/2017</a:t>
             </a:fld>
             <a:endParaRPr lang="en-US" dirty="0"/>
           </a:p>
@@ -721,7 +721,7 @@
           <a:p>
             <a:fld id="{4509A250-FF31-4206-8172-F9D3106AACB1}" type="datetimeFigureOut">
               <a:rPr lang="en-US" smtClean="0"/>
-              <a:t>5/24/2017</a:t>
+              <a:t>6/4/2017</a:t>
             </a:fld>
             <a:endParaRPr lang="en-US" dirty="0"/>
           </a:p>
@@ -946,7 +946,7 @@
           <a:p>
             <a:fld id="{4509A250-FF31-4206-8172-F9D3106AACB1}" type="datetimeFigureOut">
               <a:rPr lang="en-US" smtClean="0"/>
-              <a:t>5/24/2017</a:t>
+              <a:t>6/4/2017</a:t>
             </a:fld>
             <a:endParaRPr lang="en-US" dirty="0"/>
           </a:p>
@@ -1419,7 +1419,7 @@
           <a:p>
             <a:fld id="{9796027F-7875-4030-9381-8BD8C4F21935}" type="datetimeFigureOut">
               <a:rPr lang="en-US" smtClean="0"/>
-              <a:t>5/24/2017</a:t>
+              <a:t>6/4/2017</a:t>
             </a:fld>
             <a:endParaRPr lang="en-US" dirty="0"/>
           </a:p>
@@ -1878,7 +1878,7 @@
           <a:p>
             <a:fld id="{9796027F-7875-4030-9381-8BD8C4F21935}" type="datetimeFigureOut">
               <a:rPr lang="en-US" smtClean="0"/>
-              <a:t>5/24/2017</a:t>
+              <a:t>6/4/2017</a:t>
             </a:fld>
             <a:endParaRPr lang="en-US" dirty="0"/>
           </a:p>
@@ -2015,7 +2015,7 @@
           <a:p>
             <a:fld id="{4509A250-FF31-4206-8172-F9D3106AACB1}" type="datetimeFigureOut">
               <a:rPr lang="en-US" smtClean="0"/>
-              <a:t>5/24/2017</a:t>
+              <a:t>6/4/2017</a:t>
             </a:fld>
             <a:endParaRPr lang="en-US" dirty="0"/>
           </a:p>
@@ -2129,7 +2129,7 @@
           <a:p>
             <a:fld id="{4509A250-FF31-4206-8172-F9D3106AACB1}" type="datetimeFigureOut">
               <a:rPr lang="en-US" smtClean="0"/>
-              <a:t>5/24/2017</a:t>
+              <a:t>6/4/2017</a:t>
             </a:fld>
             <a:endParaRPr lang="en-US" dirty="0"/>
           </a:p>
@@ -2434,7 +2434,7 @@
           <a:p>
             <a:fld id="{4509A250-FF31-4206-8172-F9D3106AACB1}" type="datetimeFigureOut">
               <a:rPr lang="en-US" smtClean="0"/>
-              <a:t>5/24/2017</a:t>
+              <a:t>6/4/2017</a:t>
             </a:fld>
             <a:endParaRPr lang="en-US" dirty="0"/>
           </a:p>
@@ -2768,7 +2768,7 @@
           <a:p>
             <a:fld id="{4509A250-FF31-4206-8172-F9D3106AACB1}" type="datetimeFigureOut">
               <a:rPr lang="en-US" smtClean="0"/>
-              <a:t>5/24/2017</a:t>
+              <a:t>6/4/2017</a:t>
             </a:fld>
             <a:endParaRPr lang="en-US" dirty="0"/>
           </a:p>
@@ -3000,7 +3000,7 @@
           <a:p>
             <a:fld id="{4AAD347D-5ACD-4C99-B74B-A9C85AD731AF}" type="datetimeFigureOut">
               <a:rPr lang="en-US" smtClean="0"/>
-              <a:t>5/24/2017</a:t>
+              <a:t>6/4/2017</a:t>
             </a:fld>
             <a:endParaRPr lang="en-US" dirty="0"/>
           </a:p>
@@ -6570,7 +6570,7 @@
       </p:grpSpPr>
       <p:sp>
         <p:nvSpPr>
-          <p:cNvPr id="4" name="Title 3"/>
+          <p:cNvPr id="2" name="Title 1"/>
           <p:cNvSpPr>
             <a:spLocks noGrp="1"/>
           </p:cNvSpPr>
@@ -6578,12 +6578,7 @@
             <p:ph type="title"/>
           </p:nvPr>
         </p:nvSpPr>
-        <p:spPr>
-          <a:xfrm>
-            <a:off x="209550" y="442912"/>
-            <a:ext cx="9144000" cy="1643063"/>
-          </a:xfrm>
-        </p:spPr>
+        <p:spPr/>
         <p:txBody>
           <a:bodyPr>
             <a:normAutofit/>
@@ -6592,25 +6587,23 @@
           <a:p>
             <a:r>
               <a:rPr lang="en-US" dirty="0" smtClean="0"/>
-              <a:t>Presented by  H. Paul Haiduk	</a:t>
-            </a:r>
-            <a:br>
+              <a:t>So . . . if you do not yet have a copy of this presentation</a:t>
+            </a:r>
+            <a:r>
+              <a:rPr lang="en-US" dirty="0"/>
+              <a:t> </a:t>
+            </a:r>
+            <a:r>
               <a:rPr lang="en-US" dirty="0" smtClean="0"/>
-            </a:br>
-            <a:r>
-              <a:rPr lang="en-US" dirty="0" smtClean="0"/>
-              <a:t>    hhaiduk@wtamu.edu</a:t>
-            </a:r>
-            <a:br>
-              <a:rPr lang="en-US" dirty="0" smtClean="0"/>
-            </a:br>
+              <a:t>. . .</a:t>
+            </a:r>
             <a:endParaRPr lang="en-US" dirty="0"/>
           </a:p>
         </p:txBody>
       </p:sp>
       <p:sp>
         <p:nvSpPr>
-          <p:cNvPr id="5" name="Content Placeholder 4"/>
+          <p:cNvPr id="3" name="Content Placeholder 2"/>
           <p:cNvSpPr>
             <a:spLocks noGrp="1"/>
           </p:cNvSpPr>
@@ -6620,8 +6613,8 @@
         </p:nvSpPr>
         <p:spPr>
           <a:xfrm>
-            <a:off x="123825" y="1819275"/>
-            <a:ext cx="9144000" cy="4267200"/>
+            <a:off x="1109663" y="1628775"/>
+            <a:ext cx="9144000" cy="4643438"/>
           </a:xfrm>
         </p:spPr>
         <p:txBody>
@@ -6630,94 +6623,174 @@
           </a:bodyPr>
           <a:lstStyle/>
           <a:p>
-            <a:pPr marL="0" indent="0">
-              <a:buNone/>
-            </a:pPr>
-            <a:r>
-              <a:rPr lang="en-US" sz="2800" dirty="0" smtClean="0"/>
-              <a:t>Computer Science Program Coordinator</a:t>
-            </a:r>
-          </a:p>
-          <a:p>
-            <a:pPr marL="0" indent="0">
-              <a:buNone/>
-            </a:pPr>
-            <a:r>
-              <a:rPr lang="en-US" sz="2800" dirty="0" smtClean="0"/>
-              <a:t>School of Engineering, Computer Science</a:t>
+            <a:r>
+              <a:rPr lang="en-US" sz="2400" dirty="0"/>
+              <a:t>I</a:t>
+            </a:r>
+            <a:r>
+              <a:rPr lang="en-US" sz="2400" dirty="0" smtClean="0"/>
+              <a:t>t is yours for the copying from GitHub.  Please </a:t>
+            </a:r>
+            <a:r>
+              <a:rPr lang="en-US" sz="2400" dirty="0"/>
+              <a:t>use the URL</a:t>
+            </a:r>
+            <a:r>
+              <a:rPr lang="en-US" sz="2400" dirty="0" smtClean="0"/>
+              <a:t>:</a:t>
             </a:r>
             <a:br>
-              <a:rPr lang="en-US" sz="2800" dirty="0" smtClean="0"/>
+              <a:rPr lang="en-US" sz="2400" dirty="0" smtClean="0"/>
             </a:br>
             <a:r>
-              <a:rPr lang="en-US" sz="2800" dirty="0" smtClean="0"/>
-              <a:t>     and Mathematics</a:t>
-            </a:r>
-          </a:p>
-          <a:p>
-            <a:pPr marL="0" indent="0">
-              <a:buNone/>
-            </a:pPr>
-            <a:r>
-              <a:rPr lang="en-US" sz="2800" dirty="0" smtClean="0"/>
-              <a:t>West Texas A&amp;M University</a:t>
-            </a:r>
-          </a:p>
-          <a:p>
-            <a:pPr marL="0" indent="0">
-              <a:buNone/>
-            </a:pPr>
-            <a:r>
-              <a:rPr lang="en-US" sz="2800" dirty="0" smtClean="0"/>
-              <a:t>Canyon, TX </a:t>
-            </a:r>
-          </a:p>
-          <a:p>
-            <a:pPr marL="0" indent="0">
-              <a:buNone/>
-            </a:pPr>
-            <a:r>
-              <a:rPr lang="en-US" sz="2800" dirty="0" smtClean="0"/>
-              <a:t>(806) 651-2450</a:t>
-            </a:r>
-            <a:endParaRPr lang="en-US" sz="2800" dirty="0"/>
-          </a:p>
-        </p:txBody>
-      </p:sp>
-      <p:pic>
-        <p:nvPicPr>
-          <p:cNvPr id="6" name="Picture 5"/>
-          <p:cNvPicPr>
-            <a:picLocks noChangeAspect="1"/>
-          </p:cNvPicPr>
-          <p:nvPr/>
-        </p:nvPicPr>
-        <p:blipFill>
-          <a:blip r:embed="rId2">
-            <a:extLst>
-              <a:ext uri="{28A0092B-C50C-407E-A947-70E740481C1C}">
-                <a14:useLocalDpi xmlns:a14="http://schemas.microsoft.com/office/drawing/2010/main" val="0"/>
-              </a:ext>
-            </a:extLst>
-          </a:blip>
-          <a:stretch>
-            <a:fillRect/>
-          </a:stretch>
-        </p:blipFill>
-        <p:spPr>
-          <a:xfrm>
-            <a:off x="6643688" y="1476376"/>
-            <a:ext cx="4995862" cy="4995862"/>
-          </a:xfrm>
-          <a:prstGeom prst="rect">
-            <a:avLst/>
-          </a:prstGeom>
-        </p:spPr>
-      </p:pic>
+              <a:rPr lang="en-US" sz="2400" dirty="0"/>
+              <a:t/>
+            </a:r>
+            <a:br>
+              <a:rPr lang="en-US" sz="2400" dirty="0"/>
+            </a:br>
+            <a:r>
+              <a:rPr lang="en-US" sz="2400" dirty="0" smtClean="0"/>
+              <a:t>                  </a:t>
+            </a:r>
+            <a:r>
+              <a:rPr lang="en-US" sz="3200" dirty="0" smtClean="0">
+                <a:hlinkClick r:id="rId2"/>
+              </a:rPr>
+              <a:t>https</a:t>
+            </a:r>
+            <a:r>
+              <a:rPr lang="en-US" sz="3200" dirty="0">
+                <a:hlinkClick r:id="rId2"/>
+              </a:rPr>
+              <a:t>://</a:t>
+            </a:r>
+            <a:r>
+              <a:rPr lang="en-US" sz="3200" dirty="0" smtClean="0">
+                <a:hlinkClick r:id="rId2"/>
+              </a:rPr>
+              <a:t>github.com/HHaiduk/thunder</a:t>
+            </a:r>
+            <a:endParaRPr lang="en-US" sz="3200" dirty="0" smtClean="0"/>
+          </a:p>
+          <a:p>
+            <a:r>
+              <a:rPr lang="en-US" sz="2400" dirty="0" smtClean="0"/>
+              <a:t>Use the https download to download the file </a:t>
+            </a:r>
+            <a:br>
+              <a:rPr lang="en-US" sz="2400" dirty="0" smtClean="0"/>
+            </a:br>
+            <a:r>
+              <a:rPr lang="en-US" sz="2400" dirty="0" smtClean="0"/>
+              <a:t/>
+            </a:r>
+            <a:br>
+              <a:rPr lang="en-US" sz="2400" dirty="0" smtClean="0"/>
+            </a:br>
+            <a:r>
+              <a:rPr lang="en-US" sz="2400" dirty="0" smtClean="0"/>
+              <a:t>			</a:t>
+            </a:r>
+            <a:r>
+              <a:rPr lang="en-US" sz="2400" b="1" dirty="0" smtClean="0">
+                <a:latin typeface="Courier New" panose="02070309020205020404" pitchFamily="49" charset="0"/>
+                <a:cs typeface="Courier New" panose="02070309020205020404" pitchFamily="49" charset="0"/>
+              </a:rPr>
+              <a:t>thunder-master.zip</a:t>
+            </a:r>
+            <a:r>
+              <a:rPr lang="en-US" sz="2400" dirty="0">
+                <a:latin typeface="Courier New" panose="02070309020205020404" pitchFamily="49" charset="0"/>
+                <a:cs typeface="Courier New" panose="02070309020205020404" pitchFamily="49" charset="0"/>
+              </a:rPr>
+              <a:t/>
+            </a:r>
+            <a:br>
+              <a:rPr lang="en-US" sz="2400" dirty="0">
+                <a:latin typeface="Courier New" panose="02070309020205020404" pitchFamily="49" charset="0"/>
+                <a:cs typeface="Courier New" panose="02070309020205020404" pitchFamily="49" charset="0"/>
+              </a:rPr>
+            </a:br>
+            <a:r>
+              <a:rPr lang="en-US" sz="2400" dirty="0" smtClean="0"/>
+              <a:t/>
+            </a:r>
+            <a:br>
+              <a:rPr lang="en-US" sz="2400" dirty="0" smtClean="0"/>
+            </a:br>
+            <a:r>
+              <a:rPr lang="en-US" sz="2400" dirty="0" smtClean="0"/>
+              <a:t>You should extract contents of the zip file which creates the directory/folder </a:t>
+            </a:r>
+            <a:r>
+              <a:rPr lang="en-US" sz="2400" b="1" dirty="0" smtClean="0">
+                <a:latin typeface="Courier New" panose="02070309020205020404" pitchFamily="49" charset="0"/>
+                <a:cs typeface="Courier New" panose="02070309020205020404" pitchFamily="49" charset="0"/>
+              </a:rPr>
+              <a:t>thunder-master</a:t>
+            </a:r>
+            <a:r>
+              <a:rPr lang="en-US" sz="2400" dirty="0" smtClean="0">
+                <a:latin typeface="Courier New" panose="02070309020205020404" pitchFamily="49" charset="0"/>
+                <a:cs typeface="Courier New" panose="02070309020205020404" pitchFamily="49" charset="0"/>
+              </a:rPr>
+              <a:t>. </a:t>
+            </a:r>
+            <a:r>
+              <a:rPr lang="en-US" sz="2400" dirty="0" smtClean="0">
+                <a:cs typeface="Courier New" panose="02070309020205020404" pitchFamily="49" charset="0"/>
+              </a:rPr>
+              <a:t>Navigate to that directory/folder and click on the file </a:t>
+            </a:r>
+            <a:r>
+              <a:rPr lang="en-US" sz="2400" b="1" dirty="0" smtClean="0">
+                <a:latin typeface="Courier New" panose="02070309020205020404" pitchFamily="49" charset="0"/>
+                <a:cs typeface="Courier New" panose="02070309020205020404" pitchFamily="49" charset="0"/>
+              </a:rPr>
+              <a:t>thunderWIN.exe</a:t>
+            </a:r>
+            <a:r>
+              <a:rPr lang="en-US" sz="2400" dirty="0" smtClean="0">
+                <a:cs typeface="Courier New" panose="02070309020205020404" pitchFamily="49" charset="0"/>
+              </a:rPr>
+              <a:t> </a:t>
+            </a:r>
+            <a:r>
+              <a:rPr lang="en-US" sz="2400" dirty="0" smtClean="0">
+                <a:cs typeface="Courier New" panose="02070309020205020404" pitchFamily="49" charset="0"/>
+              </a:rPr>
+              <a:t>(assuming that you are running MS Windows).  </a:t>
+            </a:r>
+            <a:r>
+              <a:rPr lang="en-US" sz="2400" dirty="0" smtClean="0">
+                <a:cs typeface="Courier New" panose="02070309020205020404" pitchFamily="49" charset="0"/>
+              </a:rPr>
+              <a:t>The file is </a:t>
+            </a:r>
+            <a:r>
+              <a:rPr lang="en-US" sz="2400" b="1" dirty="0" err="1" smtClean="0">
+                <a:latin typeface="Courier New" panose="02070309020205020404" pitchFamily="49" charset="0"/>
+                <a:cs typeface="Courier New" panose="02070309020205020404" pitchFamily="49" charset="0"/>
+              </a:rPr>
+              <a:t>thunderLINUX</a:t>
+            </a:r>
+            <a:r>
+              <a:rPr lang="en-US" sz="2400" dirty="0" smtClean="0">
+                <a:cs typeface="Courier New" panose="02070309020205020404" pitchFamily="49" charset="0"/>
+              </a:rPr>
+              <a:t> if you are running Linux.  Sorry, no version for the MAC yet.</a:t>
+            </a:r>
+            <a:endParaRPr lang="en-US" sz="2400" dirty="0">
+              <a:cs typeface="Courier New" panose="02070309020205020404" pitchFamily="49" charset="0"/>
+            </a:endParaRPr>
+          </a:p>
+        </p:txBody>
+      </p:sp>
     </p:spTree>
     <p:extLst>
       <p:ext uri="{BB962C8B-B14F-4D97-AF65-F5344CB8AC3E}">
-        <p14:creationId xmlns:p14="http://schemas.microsoft.com/office/powerpoint/2010/main" val="4289020396"/>
+        <p14:creationId xmlns:p14="http://schemas.microsoft.com/office/powerpoint/2010/main" val="3505545123"/>
       </p:ext>
     </p:extLst>
   </p:cSld>
@@ -8596,7 +8669,7 @@
       </p:grpSpPr>
       <p:sp>
         <p:nvSpPr>
-          <p:cNvPr id="2" name="Title 1"/>
+          <p:cNvPr id="4" name="Title 3"/>
           <p:cNvSpPr>
             <a:spLocks noGrp="1"/>
           </p:cNvSpPr>
@@ -8606,36 +8679,8 @@
         </p:nvSpPr>
         <p:spPr>
           <a:xfrm>
-            <a:off x="1538288" y="0"/>
-            <a:ext cx="9144000" cy="1143000"/>
-          </a:xfrm>
-        </p:spPr>
-        <p:txBody>
-          <a:bodyPr/>
-          <a:lstStyle/>
-          <a:p>
-            <a:r>
-              <a:rPr lang="en-US" dirty="0" smtClean="0"/>
-              <a:t>Attribution to Richard Pattis	</a:t>
-            </a:r>
-            <a:endParaRPr lang="en-US" dirty="0"/>
-          </a:p>
-        </p:txBody>
-      </p:sp>
-      <p:sp>
-        <p:nvSpPr>
-          <p:cNvPr id="3" name="Content Placeholder 2"/>
-          <p:cNvSpPr>
-            <a:spLocks noGrp="1"/>
-          </p:cNvSpPr>
-          <p:nvPr>
-            <p:ph idx="1"/>
-          </p:nvPr>
-        </p:nvSpPr>
-        <p:spPr>
-          <a:xfrm>
-            <a:off x="571500" y="1300163"/>
-            <a:ext cx="10110788" cy="4857750"/>
+            <a:off x="209550" y="442912"/>
+            <a:ext cx="9144000" cy="1643063"/>
           </a:xfrm>
         </p:spPr>
         <p:txBody>
@@ -8645,86 +8690,133 @@
           <a:lstStyle/>
           <a:p>
             <a:r>
-              <a:rPr lang="en-US" sz="2200" dirty="0" smtClean="0"/>
-              <a:t>Karel the Robot </a:t>
-            </a:r>
-            <a:r>
-              <a:rPr lang="en-US" sz="2200" i="1" dirty="0" smtClean="0"/>
-              <a:t>circa </a:t>
-            </a:r>
-            <a:r>
-              <a:rPr lang="en-US" sz="2200" dirty="0" smtClean="0"/>
-              <a:t>1981 for the seminal book </a:t>
-            </a:r>
-            <a:r>
-              <a:rPr lang="en-US" sz="2200" b="1" i="1" dirty="0" smtClean="0"/>
-              <a:t>Karel the Robot</a:t>
-            </a:r>
-            <a:r>
-              <a:rPr lang="en-US" sz="2200" dirty="0" smtClean="0"/>
-              <a:t>.  </a:t>
-            </a:r>
-          </a:p>
-          <a:p>
-            <a:r>
-              <a:rPr lang="en-US" altLang="en-US" sz="2200" dirty="0" smtClean="0"/>
-              <a:t>The </a:t>
-            </a:r>
-            <a:r>
-              <a:rPr lang="en-US" altLang="en-US" sz="2200" dirty="0"/>
-              <a:t>word robot comes from the Czech word </a:t>
-            </a:r>
-            <a:r>
-              <a:rPr lang="en-US" altLang="en-US" sz="2200" i="1" dirty="0"/>
-              <a:t>robota,</a:t>
-            </a:r>
-            <a:r>
-              <a:rPr lang="en-US" altLang="en-US" sz="2200" dirty="0"/>
-              <a:t> meaning drudgery or slave-like labor. It was first used to describe fabricated workers in a fictional </a:t>
-            </a:r>
-            <a:r>
-              <a:rPr lang="en-US" altLang="en-US" sz="2200" dirty="0" smtClean="0"/>
-              <a:t>1920’s </a:t>
-            </a:r>
-            <a:r>
-              <a:rPr lang="en-US" altLang="en-US" sz="2200" dirty="0"/>
-              <a:t>play by Czech author Karel Capek called </a:t>
-            </a:r>
-            <a:r>
-              <a:rPr lang="en-US" altLang="en-US" sz="2200" i="1" dirty="0"/>
-              <a:t>Rossum’s Universal Robots.</a:t>
-            </a:r>
-            <a:r>
-              <a:rPr lang="en-US" altLang="en-US" sz="2200" dirty="0"/>
-              <a:t> </a:t>
-            </a:r>
-            <a:r>
-              <a:rPr lang="en-US" altLang="en-US" sz="2200" dirty="0" smtClean="0"/>
-              <a:t>  According to Pattis, the name Karel the Robot was derived from that early fictional concept and author.</a:t>
-            </a:r>
-          </a:p>
-          <a:p>
-            <a:r>
-              <a:rPr lang="en-US" altLang="en-US" sz="2200" dirty="0" smtClean="0"/>
-              <a:t>The work as presented today is motivated by the desire to keep alive one of the most profound concepts in computing  and one from which literally hundreds of my students have begun their journey into that facet of computational thinking called algorithmic thinking.</a:t>
-            </a:r>
-          </a:p>
-          <a:p>
-            <a:r>
-              <a:rPr lang="en-US" altLang="en-US" sz="2200" dirty="0" smtClean="0"/>
-              <a:t>Original version of the software written in Pascal and was designed to lead students into the world of Pascal programming.  Subsequent versions have been focused on C++ and also Java.</a:t>
-            </a:r>
-            <a:endParaRPr lang="en-US" altLang="en-US" sz="2200" dirty="0"/>
-          </a:p>
-          <a:p>
+              <a:rPr lang="en-US" dirty="0" smtClean="0"/>
+              <a:t>Presented by  H. Paul Haiduk	</a:t>
+            </a:r>
+            <a:br>
+              <a:rPr lang="en-US" dirty="0" smtClean="0"/>
+            </a:br>
+            <a:r>
+              <a:rPr lang="en-US" dirty="0" smtClean="0"/>
+              <a:t>    hhaiduk@wtamu.edu</a:t>
+            </a:r>
+            <a:br>
+              <a:rPr lang="en-US" dirty="0" smtClean="0"/>
+            </a:br>
             <a:endParaRPr lang="en-US" dirty="0"/>
           </a:p>
         </p:txBody>
       </p:sp>
+      <p:sp>
+        <p:nvSpPr>
+          <p:cNvPr id="5" name="Content Placeholder 4"/>
+          <p:cNvSpPr>
+            <a:spLocks noGrp="1"/>
+          </p:cNvSpPr>
+          <p:nvPr>
+            <p:ph idx="1"/>
+          </p:nvPr>
+        </p:nvSpPr>
+        <p:spPr>
+          <a:xfrm>
+            <a:off x="123825" y="1819275"/>
+            <a:ext cx="9144000" cy="4267200"/>
+          </a:xfrm>
+        </p:spPr>
+        <p:txBody>
+          <a:bodyPr>
+            <a:normAutofit/>
+          </a:bodyPr>
+          <a:lstStyle/>
+          <a:p>
+            <a:pPr marL="0" indent="0">
+              <a:buNone/>
+            </a:pPr>
+            <a:r>
+              <a:rPr lang="en-US" sz="2800" dirty="0" smtClean="0"/>
+              <a:t>Computer Science Program Coordinator</a:t>
+            </a:r>
+          </a:p>
+          <a:p>
+            <a:pPr marL="0" indent="0">
+              <a:buNone/>
+            </a:pPr>
+            <a:r>
+              <a:rPr lang="en-US" sz="2800" dirty="0" smtClean="0"/>
+              <a:t>School of Engineering, Computer Science</a:t>
+            </a:r>
+            <a:br>
+              <a:rPr lang="en-US" sz="2800" dirty="0" smtClean="0"/>
+            </a:br>
+            <a:r>
+              <a:rPr lang="en-US" sz="2800" dirty="0" smtClean="0"/>
+              <a:t>     and Mathematics</a:t>
+            </a:r>
+          </a:p>
+          <a:p>
+            <a:pPr marL="0" indent="0">
+              <a:buNone/>
+            </a:pPr>
+            <a:r>
+              <a:rPr lang="en-US" sz="2800" dirty="0" smtClean="0"/>
+              <a:t>West Texas A&amp;M University</a:t>
+            </a:r>
+          </a:p>
+          <a:p>
+            <a:pPr marL="0" indent="0">
+              <a:buNone/>
+            </a:pPr>
+            <a:r>
+              <a:rPr lang="en-US" sz="2800" dirty="0" smtClean="0"/>
+              <a:t>Canyon, TX </a:t>
+            </a:r>
+          </a:p>
+          <a:p>
+            <a:pPr marL="0" indent="0">
+              <a:buNone/>
+            </a:pPr>
+            <a:r>
+              <a:rPr lang="en-US" sz="2800" dirty="0" smtClean="0"/>
+              <a:t>(806) 651-2450</a:t>
+            </a:r>
+            <a:endParaRPr lang="en-US" sz="2800" dirty="0"/>
+          </a:p>
+        </p:txBody>
+      </p:sp>
+      <p:pic>
+        <p:nvPicPr>
+          <p:cNvPr id="6" name="Picture 5"/>
+          <p:cNvPicPr>
+            <a:picLocks noChangeAspect="1"/>
+          </p:cNvPicPr>
+          <p:nvPr/>
+        </p:nvPicPr>
+        <p:blipFill>
+          <a:blip r:embed="rId2">
+            <a:extLst>
+              <a:ext uri="{28A0092B-C50C-407E-A947-70E740481C1C}">
+                <a14:useLocalDpi xmlns:a14="http://schemas.microsoft.com/office/drawing/2010/main" val="0"/>
+              </a:ext>
+            </a:extLst>
+          </a:blip>
+          <a:stretch>
+            <a:fillRect/>
+          </a:stretch>
+        </p:blipFill>
+        <p:spPr>
+          <a:xfrm>
+            <a:off x="6643688" y="1476376"/>
+            <a:ext cx="4995862" cy="4995862"/>
+          </a:xfrm>
+          <a:prstGeom prst="rect">
+            <a:avLst/>
+          </a:prstGeom>
+        </p:spPr>
+      </p:pic>
     </p:spTree>
     <p:extLst>
       <p:ext uri="{BB962C8B-B14F-4D97-AF65-F5344CB8AC3E}">
-        <p14:creationId xmlns:p14="http://schemas.microsoft.com/office/powerpoint/2010/main" val="3763525660"/>
+        <p14:creationId xmlns:p14="http://schemas.microsoft.com/office/powerpoint/2010/main" val="4289020396"/>
       </p:ext>
     </p:extLst>
   </p:cSld>
@@ -9369,14 +9461,19 @@
             <p:ph type="title"/>
           </p:nvPr>
         </p:nvSpPr>
-        <p:spPr/>
+        <p:spPr>
+          <a:xfrm>
+            <a:off x="1538288" y="0"/>
+            <a:ext cx="9144000" cy="1143000"/>
+          </a:xfrm>
+        </p:spPr>
         <p:txBody>
           <a:bodyPr/>
           <a:lstStyle/>
           <a:p>
             <a:r>
               <a:rPr lang="en-US" dirty="0" smtClean="0"/>
-              <a:t>Thunder the Robot	</a:t>
+              <a:t>Attribution to Richard Pattis	</a:t>
             </a:r>
             <a:endParaRPr lang="en-US" dirty="0"/>
           </a:p>
@@ -9392,41 +9489,91 @@
             <p:ph idx="1"/>
           </p:nvPr>
         </p:nvSpPr>
-        <p:spPr/>
+        <p:spPr>
+          <a:xfrm>
+            <a:off x="571500" y="1300163"/>
+            <a:ext cx="10110788" cy="4857750"/>
+          </a:xfrm>
+        </p:spPr>
         <p:txBody>
           <a:bodyPr>
-            <a:normAutofit lnSpcReduction="10000"/>
+            <a:normAutofit/>
           </a:bodyPr>
           <a:lstStyle/>
           <a:p>
             <a:r>
-              <a:rPr lang="en-US" sz="2400" dirty="0" smtClean="0"/>
-              <a:t>Named so to recognize the mascot for WTAMU . . . a buffalo named Thunder.</a:t>
-            </a:r>
-          </a:p>
-          <a:p>
-            <a:r>
-              <a:rPr lang="en-US" sz="2400" dirty="0" smtClean="0"/>
-              <a:t>Designed to be a “gentle” introduction to the art of algorithmic thinking and programming</a:t>
-            </a:r>
-          </a:p>
-          <a:p>
-            <a:r>
-              <a:rPr lang="en-US" sz="2400" dirty="0" smtClean="0"/>
-              <a:t>Designed to be a gentle introduction to text-based programming  with syntax very similar to Python syntax</a:t>
-            </a:r>
-          </a:p>
-          <a:p>
-            <a:r>
-              <a:rPr lang="en-US" sz="2400" dirty="0" smtClean="0"/>
-              <a:t>Written in Java with a “look and feel” designed to be essentially the same in Chrome OS, Linux, Mac and Windows – any platform that supports the Java Virtual Machine</a:t>
-            </a:r>
-          </a:p>
-          <a:p>
-            <a:r>
-              <a:rPr lang="en-US" sz="2400" dirty="0" smtClean="0"/>
-              <a:t>Subsequent work planned to render software completely platform independent by use of JavaScript and HTML 5.</a:t>
-            </a:r>
+              <a:rPr lang="en-US" sz="2200" dirty="0" smtClean="0"/>
+              <a:t>Karel the Robot </a:t>
+            </a:r>
+            <a:r>
+              <a:rPr lang="en-US" sz="2200" i="1" dirty="0" smtClean="0"/>
+              <a:t>circa </a:t>
+            </a:r>
+            <a:r>
+              <a:rPr lang="en-US" sz="2200" dirty="0" smtClean="0"/>
+              <a:t>1981 for the seminal book </a:t>
+            </a:r>
+            <a:r>
+              <a:rPr lang="en-US" sz="2200" b="1" i="1" dirty="0" smtClean="0"/>
+              <a:t>Karel the Robot</a:t>
+            </a:r>
+            <a:r>
+              <a:rPr lang="en-US" sz="2200" dirty="0" smtClean="0"/>
+              <a:t>.  </a:t>
+            </a:r>
+          </a:p>
+          <a:p>
+            <a:r>
+              <a:rPr lang="en-US" altLang="en-US" sz="2200" dirty="0" smtClean="0"/>
+              <a:t>The </a:t>
+            </a:r>
+            <a:r>
+              <a:rPr lang="en-US" altLang="en-US" sz="2200" dirty="0"/>
+              <a:t>word robot comes from the Czech word </a:t>
+            </a:r>
+            <a:r>
+              <a:rPr lang="en-US" altLang="en-US" sz="2200" i="1" dirty="0"/>
+              <a:t>robota,</a:t>
+            </a:r>
+            <a:r>
+              <a:rPr lang="en-US" altLang="en-US" sz="2200" dirty="0"/>
+              <a:t> meaning drudgery or slave-like labor. It was first used to describe fabricated workers in a fictional </a:t>
+            </a:r>
+            <a:r>
+              <a:rPr lang="en-US" altLang="en-US" sz="2200" dirty="0" smtClean="0"/>
+              <a:t>1920’s </a:t>
+            </a:r>
+            <a:r>
+              <a:rPr lang="en-US" altLang="en-US" sz="2200" dirty="0"/>
+              <a:t>play by Czech author Karel Capek called </a:t>
+            </a:r>
+            <a:r>
+              <a:rPr lang="en-US" altLang="en-US" sz="2200" i="1" dirty="0"/>
+              <a:t>Rossum’s Universal Robots.</a:t>
+            </a:r>
+            <a:r>
+              <a:rPr lang="en-US" altLang="en-US" sz="2200" dirty="0"/>
+              <a:t> </a:t>
+            </a:r>
+            <a:r>
+              <a:rPr lang="en-US" altLang="en-US" sz="2200" dirty="0" smtClean="0"/>
+              <a:t>  According to Pattis, the name Karel the Robot was derived from that early fictional concept and author.</a:t>
+            </a:r>
+          </a:p>
+          <a:p>
+            <a:r>
+              <a:rPr lang="en-US" altLang="en-US" sz="2200" dirty="0" smtClean="0"/>
+              <a:t>The work as presented today is motivated by the desire to keep alive one of the most profound concepts in computing  and one from which literally hundreds of my students have begun their journey into that facet of computational thinking called algorithmic thinking.</a:t>
+            </a:r>
+          </a:p>
+          <a:p>
+            <a:r>
+              <a:rPr lang="en-US" altLang="en-US" sz="2200" dirty="0" smtClean="0"/>
+              <a:t>Original version of the software written in Pascal and was designed to lead students into the world of Pascal programming.  Subsequent versions have been focused on C++ and also Java.</a:t>
+            </a:r>
+            <a:endParaRPr lang="en-US" altLang="en-US" sz="2200" dirty="0"/>
+          </a:p>
+          <a:p>
             <a:endParaRPr lang="en-US" dirty="0"/>
           </a:p>
         </p:txBody>
@@ -9434,7 +9581,7 @@
     </p:spTree>
     <p:extLst>
       <p:ext uri="{BB962C8B-B14F-4D97-AF65-F5344CB8AC3E}">
-        <p14:creationId xmlns:p14="http://schemas.microsoft.com/office/powerpoint/2010/main" val="2080774550"/>
+        <p14:creationId xmlns:p14="http://schemas.microsoft.com/office/powerpoint/2010/main" val="3763525660"/>
       </p:ext>
     </p:extLst>
   </p:cSld>
@@ -9492,124 +9639,70 @@
         </p:nvSpPr>
         <p:spPr/>
         <p:txBody>
+          <a:bodyPr/>
+          <a:lstStyle/>
+          <a:p>
+            <a:r>
+              <a:rPr lang="en-US" dirty="0" smtClean="0"/>
+              <a:t>Thunder the Robot	</a:t>
+            </a:r>
+            <a:endParaRPr lang="en-US" dirty="0"/>
+          </a:p>
+        </p:txBody>
+      </p:sp>
+      <p:sp>
+        <p:nvSpPr>
+          <p:cNvPr id="3" name="Content Placeholder 2"/>
+          <p:cNvSpPr>
+            <a:spLocks noGrp="1"/>
+          </p:cNvSpPr>
+          <p:nvPr>
+            <p:ph idx="1"/>
+          </p:nvPr>
+        </p:nvSpPr>
+        <p:spPr/>
+        <p:txBody>
           <a:bodyPr>
-            <a:normAutofit fontScale="90000"/>
+            <a:normAutofit lnSpcReduction="10000"/>
           </a:bodyPr>
           <a:lstStyle/>
           <a:p>
             <a:r>
-              <a:rPr lang="en-US" dirty="0" smtClean="0"/>
-              <a:t>So . . . if you have your computer set up with an Oracle Java runtime . . .</a:t>
+              <a:rPr lang="en-US" sz="2400" dirty="0" smtClean="0"/>
+              <a:t>Named so to recognize the mascot for WTAMU . . . a buffalo named Thunder.</a:t>
+            </a:r>
+          </a:p>
+          <a:p>
+            <a:r>
+              <a:rPr lang="en-US" sz="2400" dirty="0" smtClean="0"/>
+              <a:t>Designed to be a “gentle” introduction to the art of algorithmic thinking and programming</a:t>
+            </a:r>
+          </a:p>
+          <a:p>
+            <a:r>
+              <a:rPr lang="en-US" sz="2400" dirty="0" smtClean="0"/>
+              <a:t>Designed to be a gentle introduction to text-based programming  with syntax very similar to Python syntax</a:t>
+            </a:r>
+          </a:p>
+          <a:p>
+            <a:r>
+              <a:rPr lang="en-US" sz="2400" dirty="0" smtClean="0"/>
+              <a:t>Written in Java with a “look and feel” designed to be essentially the same in Chrome OS, Linux, Mac and Windows – any platform that supports the Java Virtual Machine</a:t>
+            </a:r>
+          </a:p>
+          <a:p>
+            <a:r>
+              <a:rPr lang="en-US" sz="2400" dirty="0" smtClean="0"/>
+              <a:t>Subsequent work planned to render software completely platform independent by use of JavaScript and HTML 5.</a:t>
             </a:r>
             <a:endParaRPr lang="en-US" dirty="0"/>
-          </a:p>
-        </p:txBody>
-      </p:sp>
-      <p:sp>
-        <p:nvSpPr>
-          <p:cNvPr id="3" name="Content Placeholder 2"/>
-          <p:cNvSpPr>
-            <a:spLocks noGrp="1"/>
-          </p:cNvSpPr>
-          <p:nvPr>
-            <p:ph idx="1"/>
-          </p:nvPr>
-        </p:nvSpPr>
-        <p:spPr/>
-        <p:txBody>
-          <a:bodyPr>
-            <a:normAutofit/>
-          </a:bodyPr>
-          <a:lstStyle/>
-          <a:p>
-            <a:r>
-              <a:rPr lang="en-US" sz="2400" dirty="0" smtClean="0"/>
-              <a:t>And if you do NOT have the software on your laptop, it is yours for the copying from GitHub.  Please </a:t>
-            </a:r>
-            <a:r>
-              <a:rPr lang="en-US" sz="2400" dirty="0"/>
-              <a:t>use the URL:</a:t>
-            </a:r>
-            <a:br>
-              <a:rPr lang="en-US" sz="2400" dirty="0"/>
-            </a:br>
-            <a:r>
-              <a:rPr lang="en-US" sz="2400" dirty="0"/>
-              <a:t/>
-            </a:r>
-            <a:br>
-              <a:rPr lang="en-US" sz="2400" dirty="0"/>
-            </a:br>
-            <a:r>
-              <a:rPr lang="en-US" sz="2400" dirty="0"/>
-              <a:t>                            </a:t>
-            </a:r>
-            <a:r>
-              <a:rPr lang="en-US" sz="2400" dirty="0">
-                <a:hlinkClick r:id="rId2"/>
-              </a:rPr>
-              <a:t>https://</a:t>
-            </a:r>
-            <a:r>
-              <a:rPr lang="en-US" sz="2400" dirty="0" smtClean="0">
-                <a:hlinkClick r:id="rId2"/>
-              </a:rPr>
-              <a:t>github.com/HHaiduk/thunder</a:t>
-            </a:r>
-            <a:endParaRPr lang="en-US" sz="2400" dirty="0" smtClean="0"/>
-          </a:p>
-          <a:p>
-            <a:r>
-              <a:rPr lang="en-US" sz="2400" dirty="0" smtClean="0"/>
-              <a:t>Once downloaded, you should be able to launch its execution by navigating your file explorer to the directory/folder in which you dropped  the file </a:t>
-            </a:r>
-            <a:r>
-              <a:rPr lang="en-US" sz="2400" dirty="0" smtClean="0">
-                <a:latin typeface="Courier New" panose="02070309020205020404" pitchFamily="49" charset="0"/>
-                <a:cs typeface="Courier New" panose="02070309020205020404" pitchFamily="49" charset="0"/>
-              </a:rPr>
-              <a:t>thunder-master.zip</a:t>
-            </a:r>
-            <a:r>
-              <a:rPr lang="en-US" sz="2400" dirty="0" smtClean="0"/>
-              <a:t>.  You should extract contents of the zip file which normally creates the directory/folder </a:t>
-            </a:r>
-            <a:r>
-              <a:rPr lang="en-US" sz="2400" dirty="0" smtClean="0">
-                <a:latin typeface="Courier New" panose="02070309020205020404" pitchFamily="49" charset="0"/>
-                <a:cs typeface="Courier New" panose="02070309020205020404" pitchFamily="49" charset="0"/>
-              </a:rPr>
-              <a:t>thunder-master. </a:t>
-            </a:r>
-            <a:r>
-              <a:rPr lang="en-US" sz="2400" dirty="0" smtClean="0">
-                <a:cs typeface="Courier New" panose="02070309020205020404" pitchFamily="49" charset="0"/>
-              </a:rPr>
-              <a:t>Navigate to that directory/folder and click on the file </a:t>
-            </a:r>
-            <a:r>
-              <a:rPr lang="en-US" sz="2400" dirty="0" smtClean="0">
-                <a:latin typeface="Courier New" panose="02070309020205020404" pitchFamily="49" charset="0"/>
-                <a:cs typeface="Courier New" panose="02070309020205020404" pitchFamily="49" charset="0"/>
-              </a:rPr>
-              <a:t>thunder.jar</a:t>
-            </a:r>
-            <a:r>
-              <a:rPr lang="en-US" sz="2400" dirty="0" smtClean="0">
-                <a:cs typeface="Courier New" panose="02070309020205020404" pitchFamily="49" charset="0"/>
-              </a:rPr>
-              <a:t>.</a:t>
-            </a:r>
-            <a:endParaRPr lang="en-US" sz="2400" dirty="0">
-              <a:cs typeface="Courier New" panose="02070309020205020404" pitchFamily="49" charset="0"/>
-            </a:endParaRPr>
           </a:p>
         </p:txBody>
       </p:sp>
     </p:spTree>
     <p:extLst>
       <p:ext uri="{BB962C8B-B14F-4D97-AF65-F5344CB8AC3E}">
-        <p14:creationId xmlns:p14="http://schemas.microsoft.com/office/powerpoint/2010/main" val="3505545123"/>
+        <p14:creationId xmlns:p14="http://schemas.microsoft.com/office/powerpoint/2010/main" val="2080774550"/>
       </p:ext>
     </p:extLst>
   </p:cSld>

</xml_diff>

<commit_message>
Updated presentation for distribution correction
</commit_message>
<xml_diff>
--- a/Thunder_the_Robot.pptx
+++ b/Thunder_the_Robot.pptx
@@ -3444,7 +3444,7 @@
   </p:txStyles>
   <p:extLst mod="1">
     <p:ext uri="{27BBF7A9-308A-43DC-89C8-2F10F3537804}">
-      <p15:sldGuideLst xmlns="" xmlns:p15="http://schemas.microsoft.com/office/powerpoint/2012/main">
+      <p15:sldGuideLst xmlns:p15="http://schemas.microsoft.com/office/powerpoint/2012/main" xmlns="">
         <p15:guide id="1" orient="horz" pos="2160">
           <p15:clr>
             <a:srgbClr val="F26B43"/>
@@ -6619,7 +6619,7 @@
         </p:spPr>
         <p:txBody>
           <a:bodyPr>
-            <a:normAutofit/>
+            <a:normAutofit lnSpcReduction="10000"/>
           </a:bodyPr>
           <a:lstStyle/>
           <a:p>
@@ -6748,7 +6748,7 @@
                 <a:latin typeface="Courier New" panose="02070309020205020404" pitchFamily="49" charset="0"/>
                 <a:cs typeface="Courier New" panose="02070309020205020404" pitchFamily="49" charset="0"/>
               </a:rPr>
-              <a:t>thunderWIN.exe</a:t>
+              <a:t>thunder-setup.exe</a:t>
             </a:r>
             <a:r>
               <a:rPr lang="en-US" sz="2400" dirty="0" smtClean="0">
@@ -6760,12 +6760,18 @@
               <a:rPr lang="en-US" sz="2400" dirty="0" smtClean="0">
                 <a:cs typeface="Courier New" panose="02070309020205020404" pitchFamily="49" charset="0"/>
               </a:rPr>
-              <a:t>(assuming that you are running MS Windows).  </a:t>
+              <a:t>(assuming that you are running MS Windows</a:t>
             </a:r>
             <a:r>
               <a:rPr lang="en-US" sz="2400" dirty="0" smtClean="0">
                 <a:cs typeface="Courier New" panose="02070309020205020404" pitchFamily="49" charset="0"/>
               </a:rPr>
+              <a:t>) to install the application.  </a:t>
+            </a:r>
+            <a:r>
+              <a:rPr lang="en-US" sz="2400" dirty="0" smtClean="0">
+                <a:cs typeface="Courier New" panose="02070309020205020404" pitchFamily="49" charset="0"/>
+              </a:rPr>
               <a:t>The file is </a:t>
             </a:r>
             <a:r>
@@ -6776,10 +6782,23 @@
               <a:t>thunderLINUX</a:t>
             </a:r>
             <a:r>
+              <a:rPr lang="en-US" sz="2400" b="1" dirty="0" smtClean="0">
+                <a:latin typeface="Courier New" panose="02070309020205020404" pitchFamily="49" charset="0"/>
+                <a:cs typeface="Courier New" panose="02070309020205020404" pitchFamily="49" charset="0"/>
+              </a:rPr>
+              <a:t>-setup</a:t>
+            </a:r>
+            <a:r>
               <a:rPr lang="en-US" sz="2400" dirty="0" smtClean="0">
                 <a:cs typeface="Courier New" panose="02070309020205020404" pitchFamily="49" charset="0"/>
               </a:rPr>
-              <a:t> if you are running Linux.  Sorry, no version for the MAC yet.</a:t>
+              <a:t>  if </a:t>
+            </a:r>
+            <a:r>
+              <a:rPr lang="en-US" sz="2400" dirty="0" smtClean="0">
+                <a:cs typeface="Courier New" panose="02070309020205020404" pitchFamily="49" charset="0"/>
+              </a:rPr>
+              <a:t>you are running Linux.  Sorry, no version for the MAC yet.</a:t>
             </a:r>
             <a:endParaRPr lang="en-US" sz="2400" dirty="0">
               <a:cs typeface="Courier New" panose="02070309020205020404" pitchFamily="49" charset="0"/>
@@ -10762,7 +10781,7 @@
   <a:extraClrSchemeLst/>
   <a:extLst>
     <a:ext uri="{05A4C25C-085E-4340-85A3-A5531E510DB2}">
-      <thm15:themeFamily xmlns="" xmlns:thm15="http://schemas.microsoft.com/office/thememl/2012/main" name="O15_4109default" id="{E728D685-11FC-4812-BA85-57AC6F9C9F40}" vid="{BC4E008B-95FF-4815-904E-143A8EDFC1D4}"/>
+      <thm15:themeFamily xmlns:thm15="http://schemas.microsoft.com/office/thememl/2012/main" xmlns="" name="O15_4109default" id="{E728D685-11FC-4812-BA85-57AC6F9C9F40}" vid="{BC4E008B-95FF-4815-904E-143A8EDFC1D4}"/>
     </a:ext>
   </a:extLst>
 </a:theme>

</xml_diff>

<commit_message>
Final edit before presentation
</commit_message>
<xml_diff>
--- a/Thunder_the_Robot.pptx
+++ b/Thunder_the_Robot.pptx
@@ -6,8 +6,8 @@
   </p:sldMasterIdLst>
   <p:sldIdLst>
     <p:sldId id="256" r:id="rId2"/>
-    <p:sldId id="261" r:id="rId3"/>
-    <p:sldId id="257" r:id="rId4"/>
+    <p:sldId id="257" r:id="rId3"/>
+    <p:sldId id="261" r:id="rId4"/>
     <p:sldId id="258" r:id="rId5"/>
     <p:sldId id="259" r:id="rId6"/>
     <p:sldId id="262" r:id="rId7"/>
@@ -522,7 +522,7 @@
           <a:p>
             <a:fld id="{4509A250-FF31-4206-8172-F9D3106AACB1}" type="datetimeFigureOut">
               <a:rPr lang="en-US" smtClean="0"/>
-              <a:t>6/4/2017</a:t>
+              <a:t>6/5/2017</a:t>
             </a:fld>
             <a:endParaRPr lang="en-US" dirty="0"/>
           </a:p>
@@ -721,7 +721,7 @@
           <a:p>
             <a:fld id="{4509A250-FF31-4206-8172-F9D3106AACB1}" type="datetimeFigureOut">
               <a:rPr lang="en-US" smtClean="0"/>
-              <a:t>6/4/2017</a:t>
+              <a:t>6/5/2017</a:t>
             </a:fld>
             <a:endParaRPr lang="en-US" dirty="0"/>
           </a:p>
@@ -946,7 +946,7 @@
           <a:p>
             <a:fld id="{4509A250-FF31-4206-8172-F9D3106AACB1}" type="datetimeFigureOut">
               <a:rPr lang="en-US" smtClean="0"/>
-              <a:t>6/4/2017</a:t>
+              <a:t>6/5/2017</a:t>
             </a:fld>
             <a:endParaRPr lang="en-US" dirty="0"/>
           </a:p>
@@ -1419,7 +1419,7 @@
           <a:p>
             <a:fld id="{9796027F-7875-4030-9381-8BD8C4F21935}" type="datetimeFigureOut">
               <a:rPr lang="en-US" smtClean="0"/>
-              <a:t>6/4/2017</a:t>
+              <a:t>6/5/2017</a:t>
             </a:fld>
             <a:endParaRPr lang="en-US" dirty="0"/>
           </a:p>
@@ -1878,7 +1878,7 @@
           <a:p>
             <a:fld id="{9796027F-7875-4030-9381-8BD8C4F21935}" type="datetimeFigureOut">
               <a:rPr lang="en-US" smtClean="0"/>
-              <a:t>6/4/2017</a:t>
+              <a:t>6/5/2017</a:t>
             </a:fld>
             <a:endParaRPr lang="en-US" dirty="0"/>
           </a:p>
@@ -2015,7 +2015,7 @@
           <a:p>
             <a:fld id="{4509A250-FF31-4206-8172-F9D3106AACB1}" type="datetimeFigureOut">
               <a:rPr lang="en-US" smtClean="0"/>
-              <a:t>6/4/2017</a:t>
+              <a:t>6/5/2017</a:t>
             </a:fld>
             <a:endParaRPr lang="en-US" dirty="0"/>
           </a:p>
@@ -2129,7 +2129,7 @@
           <a:p>
             <a:fld id="{4509A250-FF31-4206-8172-F9D3106AACB1}" type="datetimeFigureOut">
               <a:rPr lang="en-US" smtClean="0"/>
-              <a:t>6/4/2017</a:t>
+              <a:t>6/5/2017</a:t>
             </a:fld>
             <a:endParaRPr lang="en-US" dirty="0"/>
           </a:p>
@@ -2434,7 +2434,7 @@
           <a:p>
             <a:fld id="{4509A250-FF31-4206-8172-F9D3106AACB1}" type="datetimeFigureOut">
               <a:rPr lang="en-US" smtClean="0"/>
-              <a:t>6/4/2017</a:t>
+              <a:t>6/5/2017</a:t>
             </a:fld>
             <a:endParaRPr lang="en-US" dirty="0"/>
           </a:p>
@@ -2768,7 +2768,7 @@
           <a:p>
             <a:fld id="{4509A250-FF31-4206-8172-F9D3106AACB1}" type="datetimeFigureOut">
               <a:rPr lang="en-US" smtClean="0"/>
-              <a:t>6/4/2017</a:t>
+              <a:t>6/5/2017</a:t>
             </a:fld>
             <a:endParaRPr lang="en-US" dirty="0"/>
           </a:p>
@@ -3000,7 +3000,7 @@
           <a:p>
             <a:fld id="{4AAD347D-5ACD-4C99-B74B-A9C85AD731AF}" type="datetimeFigureOut">
               <a:rPr lang="en-US" smtClean="0"/>
-              <a:t>6/4/2017</a:t>
+              <a:t>6/5/2017</a:t>
             </a:fld>
             <a:endParaRPr lang="en-US" dirty="0"/>
           </a:p>
@@ -3444,7 +3444,7 @@
   </p:txStyles>
   <p:extLst mod="1">
     <p:ext uri="{27BBF7A9-308A-43DC-89C8-2F10F3537804}">
-      <p15:sldGuideLst xmlns:p15="http://schemas.microsoft.com/office/powerpoint/2012/main" xmlns="">
+      <p15:sldGuideLst xmlns="" xmlns:p15="http://schemas.microsoft.com/office/powerpoint/2012/main">
         <p15:guide id="1" orient="horz" pos="2160">
           <p15:clr>
             <a:srgbClr val="F26B43"/>
@@ -4619,18 +4619,22 @@
           <a:p>
             <a:r>
               <a:rPr lang="en-US" dirty="0" smtClean="0"/>
-              <a:t>To avoid typing this in, first Split the editor pane away from the application pane and click File/Open Source File and navigate to the directory/folder where </a:t>
+              <a:t>To avoid typing this in, first Split the editor pane away from the application pane and click File/Open Source File and navigate to the directory/folder </a:t>
             </a:r>
             <a:r>
               <a:rPr lang="en-US" dirty="0" smtClean="0">
                 <a:latin typeface="Courier New" panose="02070309020205020404" pitchFamily="49" charset="0"/>
                 <a:cs typeface="Courier New" panose="02070309020205020404" pitchFamily="49" charset="0"/>
               </a:rPr>
-              <a:t>thunder.jar</a:t>
+              <a:t>thunder-master </a:t>
             </a:r>
             <a:r>
               <a:rPr lang="en-US" dirty="0" smtClean="0"/>
-              <a:t> exists and load  </a:t>
+              <a:t>and </a:t>
+            </a:r>
+            <a:r>
+              <a:rPr lang="en-US" dirty="0" smtClean="0"/>
+              <a:t>load  </a:t>
             </a:r>
             <a:r>
               <a:rPr lang="en-US" dirty="0" smtClean="0">
@@ -4651,7 +4655,19 @@
               <a:rPr lang="en-US" dirty="0" smtClean="0">
                 <a:cs typeface="Courier New" panose="02070309020205020404" pitchFamily="49" charset="0"/>
               </a:rPr>
-              <a:t>One could also File/Open World File and load </a:t>
+              <a:t>One </a:t>
+            </a:r>
+            <a:r>
+              <a:rPr lang="en-US" dirty="0" smtClean="0">
+                <a:cs typeface="Courier New" panose="02070309020205020404" pitchFamily="49" charset="0"/>
+              </a:rPr>
+              <a:t>should </a:t>
+            </a:r>
+            <a:r>
+              <a:rPr lang="en-US" dirty="0" smtClean="0">
+                <a:cs typeface="Courier New" panose="02070309020205020404" pitchFamily="49" charset="0"/>
+              </a:rPr>
+              <a:t>also File/Open World File and load </a:t>
             </a:r>
             <a:r>
               <a:rPr lang="en-US" dirty="0" smtClean="0">
@@ -6570,7 +6586,7 @@
       </p:grpSpPr>
       <p:sp>
         <p:nvSpPr>
-          <p:cNvPr id="2" name="Title 1"/>
+          <p:cNvPr id="4" name="Title 3"/>
           <p:cNvSpPr>
             <a:spLocks noGrp="1"/>
           </p:cNvSpPr>
@@ -6578,7 +6594,12 @@
             <p:ph type="title"/>
           </p:nvPr>
         </p:nvSpPr>
-        <p:spPr/>
+        <p:spPr>
+          <a:xfrm>
+            <a:off x="209550" y="442912"/>
+            <a:ext cx="9144000" cy="1643063"/>
+          </a:xfrm>
+        </p:spPr>
         <p:txBody>
           <a:bodyPr>
             <a:normAutofit/>
@@ -6587,23 +6608,25 @@
           <a:p>
             <a:r>
               <a:rPr lang="en-US" dirty="0" smtClean="0"/>
-              <a:t>So . . . if you do not yet have a copy of this presentation</a:t>
-            </a:r>
-            <a:r>
-              <a:rPr lang="en-US" dirty="0"/>
-              <a:t> </a:t>
-            </a:r>
-            <a:r>
+              <a:t>Presented by  H. Paul Haiduk	</a:t>
+            </a:r>
+            <a:br>
               <a:rPr lang="en-US" dirty="0" smtClean="0"/>
-              <a:t>. . .</a:t>
-            </a:r>
+            </a:br>
+            <a:r>
+              <a:rPr lang="en-US" dirty="0" smtClean="0"/>
+              <a:t>    hhaiduk@wtamu.edu</a:t>
+            </a:r>
+            <a:br>
+              <a:rPr lang="en-US" dirty="0" smtClean="0"/>
+            </a:br>
             <a:endParaRPr lang="en-US" dirty="0"/>
           </a:p>
         </p:txBody>
       </p:sp>
       <p:sp>
         <p:nvSpPr>
-          <p:cNvPr id="3" name="Content Placeholder 2"/>
+          <p:cNvPr id="5" name="Content Placeholder 4"/>
           <p:cNvSpPr>
             <a:spLocks noGrp="1"/>
           </p:cNvSpPr>
@@ -6613,203 +6636,104 @@
         </p:nvSpPr>
         <p:spPr>
           <a:xfrm>
-            <a:off x="1109663" y="1628775"/>
-            <a:ext cx="9144000" cy="4643438"/>
+            <a:off x="123825" y="1819275"/>
+            <a:ext cx="9144000" cy="4267200"/>
           </a:xfrm>
         </p:spPr>
         <p:txBody>
           <a:bodyPr>
-            <a:normAutofit lnSpcReduction="10000"/>
+            <a:normAutofit/>
           </a:bodyPr>
           <a:lstStyle/>
           <a:p>
-            <a:r>
-              <a:rPr lang="en-US" sz="2400" dirty="0"/>
-              <a:t>I</a:t>
-            </a:r>
-            <a:r>
-              <a:rPr lang="en-US" sz="2400" dirty="0" smtClean="0"/>
-              <a:t>t is yours for the copying from GitHub.  Please </a:t>
-            </a:r>
-            <a:r>
-              <a:rPr lang="en-US" sz="2400" dirty="0"/>
-              <a:t>use the URL</a:t>
-            </a:r>
-            <a:r>
-              <a:rPr lang="en-US" sz="2400" dirty="0" smtClean="0"/>
-              <a:t>:</a:t>
+            <a:pPr marL="0" indent="0">
+              <a:buNone/>
+            </a:pPr>
+            <a:r>
+              <a:rPr lang="en-US" sz="2800" dirty="0" smtClean="0"/>
+              <a:t>Computer Science Program Coordinator</a:t>
+            </a:r>
+          </a:p>
+          <a:p>
+            <a:pPr marL="0" indent="0">
+              <a:buNone/>
+            </a:pPr>
+            <a:r>
+              <a:rPr lang="en-US" sz="2800" dirty="0" smtClean="0"/>
+              <a:t>School of Engineering, Computer Science</a:t>
             </a:r>
             <a:br>
-              <a:rPr lang="en-US" sz="2400" dirty="0" smtClean="0"/>
+              <a:rPr lang="en-US" sz="2800" dirty="0" smtClean="0"/>
             </a:br>
             <a:r>
-              <a:rPr lang="en-US" sz="2400" dirty="0"/>
-              <a:t/>
-            </a:r>
-            <a:br>
-              <a:rPr lang="en-US" sz="2400" dirty="0"/>
-            </a:br>
-            <a:r>
-              <a:rPr lang="en-US" sz="2400" dirty="0" smtClean="0"/>
-              <a:t>                  </a:t>
-            </a:r>
-            <a:r>
-              <a:rPr lang="en-US" sz="3200" dirty="0" smtClean="0">
-                <a:hlinkClick r:id="rId2"/>
-              </a:rPr>
-              <a:t>https</a:t>
-            </a:r>
-            <a:r>
-              <a:rPr lang="en-US" sz="3200" dirty="0">
-                <a:hlinkClick r:id="rId2"/>
-              </a:rPr>
-              <a:t>://</a:t>
-            </a:r>
-            <a:r>
-              <a:rPr lang="en-US" sz="3200" dirty="0" smtClean="0">
-                <a:hlinkClick r:id="rId2"/>
-              </a:rPr>
-              <a:t>github.com/HHaiduk/thunder</a:t>
-            </a:r>
-            <a:endParaRPr lang="en-US" sz="3200" dirty="0" smtClean="0"/>
-          </a:p>
-          <a:p>
-            <a:r>
-              <a:rPr lang="en-US" sz="2400" dirty="0" smtClean="0"/>
-              <a:t>Use the https download to download the file </a:t>
-            </a:r>
-            <a:br>
-              <a:rPr lang="en-US" sz="2400" dirty="0" smtClean="0"/>
-            </a:br>
-            <a:r>
-              <a:rPr lang="en-US" sz="2400" dirty="0" smtClean="0"/>
-              <a:t/>
-            </a:r>
-            <a:br>
-              <a:rPr lang="en-US" sz="2400" dirty="0" smtClean="0"/>
-            </a:br>
-            <a:r>
-              <a:rPr lang="en-US" sz="2400" dirty="0" smtClean="0"/>
-              <a:t>			</a:t>
-            </a:r>
-            <a:r>
-              <a:rPr lang="en-US" sz="2400" b="1" dirty="0" smtClean="0">
-                <a:latin typeface="Courier New" panose="02070309020205020404" pitchFamily="49" charset="0"/>
-                <a:cs typeface="Courier New" panose="02070309020205020404" pitchFamily="49" charset="0"/>
-              </a:rPr>
-              <a:t>thunder-master.zip</a:t>
-            </a:r>
-            <a:r>
-              <a:rPr lang="en-US" sz="2400" dirty="0">
-                <a:latin typeface="Courier New" panose="02070309020205020404" pitchFamily="49" charset="0"/>
-                <a:cs typeface="Courier New" panose="02070309020205020404" pitchFamily="49" charset="0"/>
-              </a:rPr>
-              <a:t/>
-            </a:r>
-            <a:br>
-              <a:rPr lang="en-US" sz="2400" dirty="0">
-                <a:latin typeface="Courier New" panose="02070309020205020404" pitchFamily="49" charset="0"/>
-                <a:cs typeface="Courier New" panose="02070309020205020404" pitchFamily="49" charset="0"/>
-              </a:rPr>
-            </a:br>
-            <a:r>
-              <a:rPr lang="en-US" sz="2400" dirty="0" smtClean="0"/>
-              <a:t/>
-            </a:r>
-            <a:br>
-              <a:rPr lang="en-US" sz="2400" dirty="0" smtClean="0"/>
-            </a:br>
-            <a:r>
-              <a:rPr lang="en-US" sz="2400" dirty="0" smtClean="0"/>
-              <a:t>You should extract contents of the zip file which creates the directory/folder </a:t>
-            </a:r>
-            <a:r>
-              <a:rPr lang="en-US" sz="2400" b="1" dirty="0" smtClean="0">
-                <a:latin typeface="Courier New" panose="02070309020205020404" pitchFamily="49" charset="0"/>
-                <a:cs typeface="Courier New" panose="02070309020205020404" pitchFamily="49" charset="0"/>
-              </a:rPr>
-              <a:t>thunder-master</a:t>
-            </a:r>
-            <a:r>
-              <a:rPr lang="en-US" sz="2400" dirty="0" smtClean="0">
-                <a:latin typeface="Courier New" panose="02070309020205020404" pitchFamily="49" charset="0"/>
-                <a:cs typeface="Courier New" panose="02070309020205020404" pitchFamily="49" charset="0"/>
-              </a:rPr>
-              <a:t>. </a:t>
-            </a:r>
-            <a:r>
-              <a:rPr lang="en-US" sz="2400" dirty="0" smtClean="0">
-                <a:cs typeface="Courier New" panose="02070309020205020404" pitchFamily="49" charset="0"/>
-              </a:rPr>
-              <a:t>Navigate to that directory/folder and click on the file </a:t>
-            </a:r>
-            <a:r>
-              <a:rPr lang="en-US" sz="2400" b="1" dirty="0" smtClean="0">
-                <a:latin typeface="Courier New" panose="02070309020205020404" pitchFamily="49" charset="0"/>
-                <a:cs typeface="Courier New" panose="02070309020205020404" pitchFamily="49" charset="0"/>
-              </a:rPr>
-              <a:t>thunder-setup.exe</a:t>
-            </a:r>
-            <a:r>
-              <a:rPr lang="en-US" sz="2400" dirty="0" smtClean="0">
-                <a:cs typeface="Courier New" panose="02070309020205020404" pitchFamily="49" charset="0"/>
-              </a:rPr>
-              <a:t> </a:t>
-            </a:r>
-            <a:r>
-              <a:rPr lang="en-US" sz="2400" dirty="0" smtClean="0">
-                <a:cs typeface="Courier New" panose="02070309020205020404" pitchFamily="49" charset="0"/>
-              </a:rPr>
-              <a:t>(assuming that you are running MS Windows</a:t>
-            </a:r>
-            <a:r>
-              <a:rPr lang="en-US" sz="2400" dirty="0" smtClean="0">
-                <a:cs typeface="Courier New" panose="02070309020205020404" pitchFamily="49" charset="0"/>
-              </a:rPr>
-              <a:t>) to install the application.  </a:t>
-            </a:r>
-            <a:r>
-              <a:rPr lang="en-US" sz="2400" dirty="0" smtClean="0">
-                <a:cs typeface="Courier New" panose="02070309020205020404" pitchFamily="49" charset="0"/>
-              </a:rPr>
-              <a:t>The file is </a:t>
-            </a:r>
-            <a:r>
-              <a:rPr lang="en-US" sz="2400" b="1" dirty="0" err="1" smtClean="0">
-                <a:latin typeface="Courier New" panose="02070309020205020404" pitchFamily="49" charset="0"/>
-                <a:cs typeface="Courier New" panose="02070309020205020404" pitchFamily="49" charset="0"/>
-              </a:rPr>
-              <a:t>thunderLINUX</a:t>
-            </a:r>
-            <a:r>
-              <a:rPr lang="en-US" sz="2400" b="1" dirty="0" smtClean="0">
-                <a:latin typeface="Courier New" panose="02070309020205020404" pitchFamily="49" charset="0"/>
-                <a:cs typeface="Courier New" panose="02070309020205020404" pitchFamily="49" charset="0"/>
-              </a:rPr>
-              <a:t>-setup</a:t>
-            </a:r>
-            <a:r>
-              <a:rPr lang="en-US" sz="2400" dirty="0" smtClean="0">
-                <a:cs typeface="Courier New" panose="02070309020205020404" pitchFamily="49" charset="0"/>
-              </a:rPr>
-              <a:t>  if </a:t>
-            </a:r>
-            <a:r>
-              <a:rPr lang="en-US" sz="2400" dirty="0" smtClean="0">
-                <a:cs typeface="Courier New" panose="02070309020205020404" pitchFamily="49" charset="0"/>
-              </a:rPr>
-              <a:t>you are running Linux.  Sorry, no version for the MAC yet.</a:t>
-            </a:r>
-            <a:endParaRPr lang="en-US" sz="2400" dirty="0">
-              <a:cs typeface="Courier New" panose="02070309020205020404" pitchFamily="49" charset="0"/>
-            </a:endParaRPr>
-          </a:p>
-        </p:txBody>
-      </p:sp>
+              <a:rPr lang="en-US" sz="2800" dirty="0" smtClean="0"/>
+              <a:t>     and Mathematics</a:t>
+            </a:r>
+          </a:p>
+          <a:p>
+            <a:pPr marL="0" indent="0">
+              <a:buNone/>
+            </a:pPr>
+            <a:r>
+              <a:rPr lang="en-US" sz="2800" dirty="0" smtClean="0"/>
+              <a:t>West Texas A&amp;M University</a:t>
+            </a:r>
+          </a:p>
+          <a:p>
+            <a:pPr marL="0" indent="0">
+              <a:buNone/>
+            </a:pPr>
+            <a:r>
+              <a:rPr lang="en-US" sz="2800" dirty="0" smtClean="0"/>
+              <a:t>Canyon, TX </a:t>
+            </a:r>
+          </a:p>
+          <a:p>
+            <a:pPr marL="0" indent="0">
+              <a:buNone/>
+            </a:pPr>
+            <a:r>
+              <a:rPr lang="en-US" sz="2800" dirty="0" smtClean="0"/>
+              <a:t>(806) 651-2450</a:t>
+            </a:r>
+            <a:endParaRPr lang="en-US" sz="2800" dirty="0"/>
+          </a:p>
+        </p:txBody>
+      </p:sp>
+      <p:pic>
+        <p:nvPicPr>
+          <p:cNvPr id="6" name="Picture 5"/>
+          <p:cNvPicPr>
+            <a:picLocks noChangeAspect="1"/>
+          </p:cNvPicPr>
+          <p:nvPr/>
+        </p:nvPicPr>
+        <p:blipFill>
+          <a:blip r:embed="rId2">
+            <a:extLst>
+              <a:ext uri="{28A0092B-C50C-407E-A947-70E740481C1C}">
+                <a14:useLocalDpi xmlns:a14="http://schemas.microsoft.com/office/drawing/2010/main" val="0"/>
+              </a:ext>
+            </a:extLst>
+          </a:blip>
+          <a:stretch>
+            <a:fillRect/>
+          </a:stretch>
+        </p:blipFill>
+        <p:spPr>
+          <a:xfrm>
+            <a:off x="6643688" y="1476376"/>
+            <a:ext cx="4995862" cy="4995862"/>
+          </a:xfrm>
+          <a:prstGeom prst="rect">
+            <a:avLst/>
+          </a:prstGeom>
+        </p:spPr>
+      </p:pic>
     </p:spTree>
     <p:extLst>
       <p:ext uri="{BB962C8B-B14F-4D97-AF65-F5344CB8AC3E}">
-        <p14:creationId xmlns:p14="http://schemas.microsoft.com/office/powerpoint/2010/main" val="3505545123"/>
+        <p14:creationId xmlns:p14="http://schemas.microsoft.com/office/powerpoint/2010/main" val="4289020396"/>
       </p:ext>
     </p:extLst>
   </p:cSld>
@@ -8150,12 +8074,26 @@
           <a:lstStyle/>
           <a:p>
             <a:r>
-              <a:rPr lang="en-US" dirty="0" err="1" smtClean="0"/>
-              <a:t>Follow_right_wall</a:t>
+              <a:rPr lang="en-US" dirty="0" err="1">
+                <a:latin typeface="Courier New" panose="02070309020205020404" pitchFamily="49" charset="0"/>
+                <a:cs typeface="Courier New" panose="02070309020205020404" pitchFamily="49" charset="0"/>
+              </a:rPr>
+              <a:t>f</a:t>
+            </a:r>
+            <a:r>
+              <a:rPr lang="en-US" dirty="0" err="1" smtClean="0">
+                <a:latin typeface="Courier New" panose="02070309020205020404" pitchFamily="49" charset="0"/>
+                <a:cs typeface="Courier New" panose="02070309020205020404" pitchFamily="49" charset="0"/>
+              </a:rPr>
+              <a:t>ollow_right_wall</a:t>
             </a:r>
             <a:r>
               <a:rPr lang="en-US" dirty="0" smtClean="0"/>
-              <a:t> good for navigating a maze</a:t>
+              <a:t> </a:t>
+            </a:r>
+            <a:r>
+              <a:rPr lang="en-US" dirty="0" smtClean="0"/>
+              <a:t>good for navigating a maze</a:t>
             </a:r>
             <a:endParaRPr lang="en-US" dirty="0"/>
           </a:p>
@@ -8688,7 +8626,7 @@
       </p:grpSpPr>
       <p:sp>
         <p:nvSpPr>
-          <p:cNvPr id="4" name="Title 3"/>
+          <p:cNvPr id="2" name="Title 1"/>
           <p:cNvSpPr>
             <a:spLocks noGrp="1"/>
           </p:cNvSpPr>
@@ -8696,12 +8634,7 @@
             <p:ph type="title"/>
           </p:nvPr>
         </p:nvSpPr>
-        <p:spPr>
-          <a:xfrm>
-            <a:off x="209550" y="442912"/>
-            <a:ext cx="9144000" cy="1643063"/>
-          </a:xfrm>
-        </p:spPr>
+        <p:spPr/>
         <p:txBody>
           <a:bodyPr>
             <a:normAutofit/>
@@ -8710,25 +8643,23 @@
           <a:p>
             <a:r>
               <a:rPr lang="en-US" dirty="0" smtClean="0"/>
-              <a:t>Presented by  H. Paul Haiduk	</a:t>
-            </a:r>
-            <a:br>
+              <a:t>So . . . if you do not yet have a copy of this presentation</a:t>
+            </a:r>
+            <a:r>
+              <a:rPr lang="en-US" dirty="0"/>
+              <a:t> </a:t>
+            </a:r>
+            <a:r>
               <a:rPr lang="en-US" dirty="0" smtClean="0"/>
-            </a:br>
-            <a:r>
-              <a:rPr lang="en-US" dirty="0" smtClean="0"/>
-              <a:t>    hhaiduk@wtamu.edu</a:t>
-            </a:r>
-            <a:br>
-              <a:rPr lang="en-US" dirty="0" smtClean="0"/>
-            </a:br>
+              <a:t>. . .</a:t>
+            </a:r>
             <a:endParaRPr lang="en-US" dirty="0"/>
           </a:p>
         </p:txBody>
       </p:sp>
       <p:sp>
         <p:nvSpPr>
-          <p:cNvPr id="5" name="Content Placeholder 4"/>
+          <p:cNvPr id="3" name="Content Placeholder 2"/>
           <p:cNvSpPr>
             <a:spLocks noGrp="1"/>
           </p:cNvSpPr>
@@ -8738,104 +8669,179 @@
         </p:nvSpPr>
         <p:spPr>
           <a:xfrm>
-            <a:off x="123825" y="1819275"/>
-            <a:ext cx="9144000" cy="4267200"/>
+            <a:off x="1109663" y="1628775"/>
+            <a:ext cx="9144000" cy="4643438"/>
           </a:xfrm>
         </p:spPr>
         <p:txBody>
           <a:bodyPr>
-            <a:normAutofit/>
+            <a:normAutofit lnSpcReduction="10000"/>
           </a:bodyPr>
           <a:lstStyle/>
           <a:p>
-            <a:pPr marL="0" indent="0">
-              <a:buNone/>
-            </a:pPr>
-            <a:r>
-              <a:rPr lang="en-US" sz="2800" dirty="0" smtClean="0"/>
-              <a:t>Computer Science Program Coordinator</a:t>
-            </a:r>
-          </a:p>
-          <a:p>
-            <a:pPr marL="0" indent="0">
-              <a:buNone/>
-            </a:pPr>
-            <a:r>
-              <a:rPr lang="en-US" sz="2800" dirty="0" smtClean="0"/>
-              <a:t>School of Engineering, Computer Science</a:t>
+            <a:r>
+              <a:rPr lang="en-US" sz="2400" dirty="0"/>
+              <a:t>I</a:t>
+            </a:r>
+            <a:r>
+              <a:rPr lang="en-US" sz="2400" dirty="0" smtClean="0"/>
+              <a:t>t is yours for the copying from GitHub.  Please </a:t>
+            </a:r>
+            <a:r>
+              <a:rPr lang="en-US" sz="2400" dirty="0"/>
+              <a:t>use the URL</a:t>
+            </a:r>
+            <a:r>
+              <a:rPr lang="en-US" sz="2400" dirty="0" smtClean="0"/>
+              <a:t>:</a:t>
             </a:r>
             <a:br>
-              <a:rPr lang="en-US" sz="2800" dirty="0" smtClean="0"/>
+              <a:rPr lang="en-US" sz="2400" dirty="0" smtClean="0"/>
             </a:br>
             <a:r>
-              <a:rPr lang="en-US" sz="2800" dirty="0" smtClean="0"/>
-              <a:t>     and Mathematics</a:t>
-            </a:r>
-          </a:p>
-          <a:p>
-            <a:pPr marL="0" indent="0">
-              <a:buNone/>
-            </a:pPr>
-            <a:r>
-              <a:rPr lang="en-US" sz="2800" dirty="0" smtClean="0"/>
-              <a:t>West Texas A&amp;M University</a:t>
-            </a:r>
-          </a:p>
-          <a:p>
-            <a:pPr marL="0" indent="0">
-              <a:buNone/>
-            </a:pPr>
-            <a:r>
-              <a:rPr lang="en-US" sz="2800" dirty="0" smtClean="0"/>
-              <a:t>Canyon, TX </a:t>
-            </a:r>
-          </a:p>
-          <a:p>
-            <a:pPr marL="0" indent="0">
-              <a:buNone/>
-            </a:pPr>
-            <a:r>
-              <a:rPr lang="en-US" sz="2800" dirty="0" smtClean="0"/>
-              <a:t>(806) 651-2450</a:t>
-            </a:r>
-            <a:endParaRPr lang="en-US" sz="2800" dirty="0"/>
-          </a:p>
-        </p:txBody>
-      </p:sp>
-      <p:pic>
-        <p:nvPicPr>
-          <p:cNvPr id="6" name="Picture 5"/>
-          <p:cNvPicPr>
-            <a:picLocks noChangeAspect="1"/>
-          </p:cNvPicPr>
-          <p:nvPr/>
-        </p:nvPicPr>
-        <p:blipFill>
-          <a:blip r:embed="rId2">
-            <a:extLst>
-              <a:ext uri="{28A0092B-C50C-407E-A947-70E740481C1C}">
-                <a14:useLocalDpi xmlns:a14="http://schemas.microsoft.com/office/drawing/2010/main" val="0"/>
-              </a:ext>
-            </a:extLst>
-          </a:blip>
-          <a:stretch>
-            <a:fillRect/>
-          </a:stretch>
-        </p:blipFill>
-        <p:spPr>
-          <a:xfrm>
-            <a:off x="6643688" y="1476376"/>
-            <a:ext cx="4995862" cy="4995862"/>
-          </a:xfrm>
-          <a:prstGeom prst="rect">
-            <a:avLst/>
-          </a:prstGeom>
-        </p:spPr>
-      </p:pic>
+              <a:rPr lang="en-US" sz="2400" dirty="0"/>
+              <a:t/>
+            </a:r>
+            <a:br>
+              <a:rPr lang="en-US" sz="2400" dirty="0"/>
+            </a:br>
+            <a:r>
+              <a:rPr lang="en-US" sz="2400" dirty="0" smtClean="0"/>
+              <a:t>                  </a:t>
+            </a:r>
+            <a:r>
+              <a:rPr lang="en-US" sz="3200" dirty="0" smtClean="0">
+                <a:hlinkClick r:id="rId2"/>
+              </a:rPr>
+              <a:t>https</a:t>
+            </a:r>
+            <a:r>
+              <a:rPr lang="en-US" sz="3200" dirty="0">
+                <a:hlinkClick r:id="rId2"/>
+              </a:rPr>
+              <a:t>://</a:t>
+            </a:r>
+            <a:r>
+              <a:rPr lang="en-US" sz="3200" dirty="0" smtClean="0">
+                <a:hlinkClick r:id="rId2"/>
+              </a:rPr>
+              <a:t>github.com/HHaiduk/thunder</a:t>
+            </a:r>
+            <a:endParaRPr lang="en-US" sz="3200" dirty="0" smtClean="0"/>
+          </a:p>
+          <a:p>
+            <a:r>
+              <a:rPr lang="en-US" sz="2400" dirty="0" smtClean="0"/>
+              <a:t>Use the https download to download the file </a:t>
+            </a:r>
+            <a:br>
+              <a:rPr lang="en-US" sz="2400" dirty="0" smtClean="0"/>
+            </a:br>
+            <a:r>
+              <a:rPr lang="en-US" sz="2400" dirty="0" smtClean="0"/>
+              <a:t/>
+            </a:r>
+            <a:br>
+              <a:rPr lang="en-US" sz="2400" dirty="0" smtClean="0"/>
+            </a:br>
+            <a:r>
+              <a:rPr lang="en-US" sz="2400" dirty="0" smtClean="0"/>
+              <a:t>			</a:t>
+            </a:r>
+            <a:r>
+              <a:rPr lang="en-US" sz="2400" b="1" dirty="0" smtClean="0">
+                <a:latin typeface="Courier New" panose="02070309020205020404" pitchFamily="49" charset="0"/>
+                <a:cs typeface="Courier New" panose="02070309020205020404" pitchFamily="49" charset="0"/>
+              </a:rPr>
+              <a:t>thunder-master.zip</a:t>
+            </a:r>
+            <a:r>
+              <a:rPr lang="en-US" sz="2400" dirty="0">
+                <a:latin typeface="Courier New" panose="02070309020205020404" pitchFamily="49" charset="0"/>
+                <a:cs typeface="Courier New" panose="02070309020205020404" pitchFamily="49" charset="0"/>
+              </a:rPr>
+              <a:t/>
+            </a:r>
+            <a:br>
+              <a:rPr lang="en-US" sz="2400" dirty="0">
+                <a:latin typeface="Courier New" panose="02070309020205020404" pitchFamily="49" charset="0"/>
+                <a:cs typeface="Courier New" panose="02070309020205020404" pitchFamily="49" charset="0"/>
+              </a:rPr>
+            </a:br>
+            <a:r>
+              <a:rPr lang="en-US" sz="2400" dirty="0" smtClean="0"/>
+              <a:t/>
+            </a:r>
+            <a:br>
+              <a:rPr lang="en-US" sz="2400" dirty="0" smtClean="0"/>
+            </a:br>
+            <a:r>
+              <a:rPr lang="en-US" sz="2400" dirty="0" smtClean="0"/>
+              <a:t>You should extract contents of the zip file which creates the directory/folder </a:t>
+            </a:r>
+            <a:r>
+              <a:rPr lang="en-US" sz="2400" b="1" dirty="0" smtClean="0">
+                <a:latin typeface="Courier New" panose="02070309020205020404" pitchFamily="49" charset="0"/>
+                <a:cs typeface="Courier New" panose="02070309020205020404" pitchFamily="49" charset="0"/>
+              </a:rPr>
+              <a:t>thunder-master</a:t>
+            </a:r>
+            <a:r>
+              <a:rPr lang="en-US" sz="2400" dirty="0" smtClean="0">
+                <a:latin typeface="Courier New" panose="02070309020205020404" pitchFamily="49" charset="0"/>
+                <a:cs typeface="Courier New" panose="02070309020205020404" pitchFamily="49" charset="0"/>
+              </a:rPr>
+              <a:t>. </a:t>
+            </a:r>
+            <a:r>
+              <a:rPr lang="en-US" sz="2400" dirty="0" smtClean="0">
+                <a:cs typeface="Courier New" panose="02070309020205020404" pitchFamily="49" charset="0"/>
+              </a:rPr>
+              <a:t>Navigate to that directory/folder and click on the file </a:t>
+            </a:r>
+            <a:r>
+              <a:rPr lang="en-US" sz="2400" b="1" dirty="0" smtClean="0">
+                <a:latin typeface="Courier New" panose="02070309020205020404" pitchFamily="49" charset="0"/>
+                <a:cs typeface="Courier New" panose="02070309020205020404" pitchFamily="49" charset="0"/>
+              </a:rPr>
+              <a:t>thunder-setup.exe</a:t>
+            </a:r>
+            <a:r>
+              <a:rPr lang="en-US" sz="2400" dirty="0" smtClean="0">
+                <a:cs typeface="Courier New" panose="02070309020205020404" pitchFamily="49" charset="0"/>
+              </a:rPr>
+              <a:t> (assuming that you are running MS Windows) to install the application.  The file is </a:t>
+            </a:r>
+            <a:r>
+              <a:rPr lang="en-US" sz="2400" b="1" dirty="0" err="1" smtClean="0">
+                <a:latin typeface="Courier New" panose="02070309020205020404" pitchFamily="49" charset="0"/>
+                <a:cs typeface="Courier New" panose="02070309020205020404" pitchFamily="49" charset="0"/>
+              </a:rPr>
+              <a:t>thunderLINUX</a:t>
+            </a:r>
+            <a:r>
+              <a:rPr lang="en-US" sz="2400" b="1" dirty="0" smtClean="0">
+                <a:latin typeface="Courier New" panose="02070309020205020404" pitchFamily="49" charset="0"/>
+                <a:cs typeface="Courier New" panose="02070309020205020404" pitchFamily="49" charset="0"/>
+              </a:rPr>
+              <a:t>-setup</a:t>
+            </a:r>
+            <a:r>
+              <a:rPr lang="en-US" sz="2400" dirty="0" smtClean="0">
+                <a:cs typeface="Courier New" panose="02070309020205020404" pitchFamily="49" charset="0"/>
+              </a:rPr>
+              <a:t>  if you are running Linux.  Sorry, no version for the MAC yet.</a:t>
+            </a:r>
+            <a:endParaRPr lang="en-US" sz="2400" dirty="0">
+              <a:cs typeface="Courier New" panose="02070309020205020404" pitchFamily="49" charset="0"/>
+            </a:endParaRPr>
+          </a:p>
+        </p:txBody>
+      </p:sp>
     </p:spTree>
     <p:extLst>
       <p:ext uri="{BB962C8B-B14F-4D97-AF65-F5344CB8AC3E}">
-        <p14:creationId xmlns:p14="http://schemas.microsoft.com/office/powerpoint/2010/main" val="4289020396"/>
+        <p14:creationId xmlns:p14="http://schemas.microsoft.com/office/powerpoint/2010/main" val="3505545123"/>
       </p:ext>
     </p:extLst>
   </p:cSld>
@@ -10781,7 +10787,7 @@
   <a:extraClrSchemeLst/>
   <a:extLst>
     <a:ext uri="{05A4C25C-085E-4340-85A3-A5531E510DB2}">
-      <thm15:themeFamily xmlns:thm15="http://schemas.microsoft.com/office/thememl/2012/main" xmlns="" name="O15_4109default" id="{E728D685-11FC-4812-BA85-57AC6F9C9F40}" vid="{BC4E008B-95FF-4815-904E-143A8EDFC1D4}"/>
+      <thm15:themeFamily xmlns="" xmlns:thm15="http://schemas.microsoft.com/office/thememl/2012/main" name="O15_4109default" id="{E728D685-11FC-4812-BA85-57AC6F9C9F40}" vid="{BC4E008B-95FF-4815-904E-143A8EDFC1D4}"/>
     </a:ext>
   </a:extLst>
 </a:theme>

</xml_diff>

<commit_message>
Corrected error in presentation
</commit_message>
<xml_diff>
--- a/Thunder_the_Robot.pptx
+++ b/Thunder_the_Robot.pptx
@@ -522,7 +522,7 @@
           <a:p>
             <a:fld id="{4509A250-FF31-4206-8172-F9D3106AACB1}" type="datetimeFigureOut">
               <a:rPr lang="en-US" smtClean="0"/>
-              <a:t>6/5/2017</a:t>
+              <a:t>6/23/2017</a:t>
             </a:fld>
             <a:endParaRPr lang="en-US" dirty="0"/>
           </a:p>
@@ -721,7 +721,7 @@
           <a:p>
             <a:fld id="{4509A250-FF31-4206-8172-F9D3106AACB1}" type="datetimeFigureOut">
               <a:rPr lang="en-US" smtClean="0"/>
-              <a:t>6/5/2017</a:t>
+              <a:t>6/23/2017</a:t>
             </a:fld>
             <a:endParaRPr lang="en-US" dirty="0"/>
           </a:p>
@@ -946,7 +946,7 @@
           <a:p>
             <a:fld id="{4509A250-FF31-4206-8172-F9D3106AACB1}" type="datetimeFigureOut">
               <a:rPr lang="en-US" smtClean="0"/>
-              <a:t>6/5/2017</a:t>
+              <a:t>6/23/2017</a:t>
             </a:fld>
             <a:endParaRPr lang="en-US" dirty="0"/>
           </a:p>
@@ -1419,7 +1419,7 @@
           <a:p>
             <a:fld id="{9796027F-7875-4030-9381-8BD8C4F21935}" type="datetimeFigureOut">
               <a:rPr lang="en-US" smtClean="0"/>
-              <a:t>6/5/2017</a:t>
+              <a:t>6/23/2017</a:t>
             </a:fld>
             <a:endParaRPr lang="en-US" dirty="0"/>
           </a:p>
@@ -1878,7 +1878,7 @@
           <a:p>
             <a:fld id="{9796027F-7875-4030-9381-8BD8C4F21935}" type="datetimeFigureOut">
               <a:rPr lang="en-US" smtClean="0"/>
-              <a:t>6/5/2017</a:t>
+              <a:t>6/23/2017</a:t>
             </a:fld>
             <a:endParaRPr lang="en-US" dirty="0"/>
           </a:p>
@@ -2015,7 +2015,7 @@
           <a:p>
             <a:fld id="{4509A250-FF31-4206-8172-F9D3106AACB1}" type="datetimeFigureOut">
               <a:rPr lang="en-US" smtClean="0"/>
-              <a:t>6/5/2017</a:t>
+              <a:t>6/23/2017</a:t>
             </a:fld>
             <a:endParaRPr lang="en-US" dirty="0"/>
           </a:p>
@@ -2129,7 +2129,7 @@
           <a:p>
             <a:fld id="{4509A250-FF31-4206-8172-F9D3106AACB1}" type="datetimeFigureOut">
               <a:rPr lang="en-US" smtClean="0"/>
-              <a:t>6/5/2017</a:t>
+              <a:t>6/23/2017</a:t>
             </a:fld>
             <a:endParaRPr lang="en-US" dirty="0"/>
           </a:p>
@@ -2434,7 +2434,7 @@
           <a:p>
             <a:fld id="{4509A250-FF31-4206-8172-F9D3106AACB1}" type="datetimeFigureOut">
               <a:rPr lang="en-US" smtClean="0"/>
-              <a:t>6/5/2017</a:t>
+              <a:t>6/23/2017</a:t>
             </a:fld>
             <a:endParaRPr lang="en-US" dirty="0"/>
           </a:p>
@@ -2768,7 +2768,7 @@
           <a:p>
             <a:fld id="{4509A250-FF31-4206-8172-F9D3106AACB1}" type="datetimeFigureOut">
               <a:rPr lang="en-US" smtClean="0"/>
-              <a:t>6/5/2017</a:t>
+              <a:t>6/23/2017</a:t>
             </a:fld>
             <a:endParaRPr lang="en-US" dirty="0"/>
           </a:p>
@@ -3000,7 +3000,7 @@
           <a:p>
             <a:fld id="{4AAD347D-5ACD-4C99-B74B-A9C85AD731AF}" type="datetimeFigureOut">
               <a:rPr lang="en-US" smtClean="0"/>
-              <a:t>6/5/2017</a:t>
+              <a:t>6/23/2017</a:t>
             </a:fld>
             <a:endParaRPr lang="en-US" dirty="0"/>
           </a:p>
@@ -3444,7 +3444,7 @@
   </p:txStyles>
   <p:extLst mod="1">
     <p:ext uri="{27BBF7A9-308A-43DC-89C8-2F10F3537804}">
-      <p15:sldGuideLst xmlns="" xmlns:p15="http://schemas.microsoft.com/office/powerpoint/2012/main">
+      <p15:sldGuideLst xmlns:p15="http://schemas.microsoft.com/office/powerpoint/2012/main" xmlns="">
         <p15:guide id="1" orient="horz" pos="2160">
           <p15:clr>
             <a:srgbClr val="F26B43"/>
@@ -4630,11 +4630,7 @@
             </a:r>
             <a:r>
               <a:rPr lang="en-US" dirty="0" smtClean="0"/>
-              <a:t>and </a:t>
-            </a:r>
-            <a:r>
-              <a:rPr lang="en-US" dirty="0" smtClean="0"/>
-              <a:t>load  </a:t>
+              <a:t>and load  </a:t>
             </a:r>
             <a:r>
               <a:rPr lang="en-US" dirty="0" smtClean="0">
@@ -4655,19 +4651,7 @@
               <a:rPr lang="en-US" dirty="0" smtClean="0">
                 <a:cs typeface="Courier New" panose="02070309020205020404" pitchFamily="49" charset="0"/>
               </a:rPr>
-              <a:t>One </a:t>
-            </a:r>
-            <a:r>
-              <a:rPr lang="en-US" dirty="0" smtClean="0">
-                <a:cs typeface="Courier New" panose="02070309020205020404" pitchFamily="49" charset="0"/>
-              </a:rPr>
-              <a:t>should </a:t>
-            </a:r>
-            <a:r>
-              <a:rPr lang="en-US" dirty="0" smtClean="0">
-                <a:cs typeface="Courier New" panose="02070309020205020404" pitchFamily="49" charset="0"/>
-              </a:rPr>
-              <a:t>also File/Open World File and load </a:t>
+              <a:t>One should also File/Open World File and load </a:t>
             </a:r>
             <a:r>
               <a:rPr lang="en-US" dirty="0" smtClean="0">
@@ -5168,6 +5152,13 @@
       </p:transition>
     </mc:Fallback>
   </mc:AlternateContent>
+  <p:timing>
+    <p:tnLst>
+      <p:par>
+        <p:cTn id="1" dur="indefinite" restart="never" nodeType="tmRoot"/>
+      </p:par>
+    </p:tnLst>
+  </p:timing>
 </p:sld>
 </file>
 
@@ -5930,6 +5921,13 @@
       </p:transition>
     </mc:Fallback>
   </mc:AlternateContent>
+  <p:timing>
+    <p:tnLst>
+      <p:par>
+        <p:cTn id="1" dur="indefinite" restart="never" nodeType="tmRoot"/>
+      </p:par>
+    </p:tnLst>
+  </p:timing>
 </p:sld>
 </file>
 
@@ -6377,6 +6375,13 @@
       </p:transition>
     </mc:Fallback>
   </mc:AlternateContent>
+  <p:timing>
+    <p:tnLst>
+      <p:par>
+        <p:cTn id="1" dur="indefinite" restart="never" nodeType="tmRoot"/>
+      </p:par>
+    </p:tnLst>
+  </p:timing>
 </p:sld>
 </file>
 
@@ -6564,6 +6569,13 @@
       </p:transition>
     </mc:Fallback>
   </mc:AlternateContent>
+  <p:timing>
+    <p:tnLst>
+      <p:par>
+        <p:cTn id="1" dur="indefinite" restart="never" nodeType="tmRoot"/>
+      </p:par>
+    </p:tnLst>
+  </p:timing>
 </p:sld>
 </file>
 
@@ -6915,6 +6927,13 @@
       </p:transition>
     </mc:Fallback>
   </mc:AlternateContent>
+  <p:timing>
+    <p:tnLst>
+      <p:par>
+        <p:cTn id="1" dur="indefinite" restart="never" nodeType="tmRoot"/>
+      </p:par>
+    </p:tnLst>
+  </p:timing>
 </p:sld>
 </file>
 
@@ -7080,6 +7099,13 @@
       </p:transition>
     </mc:Fallback>
   </mc:AlternateContent>
+  <p:timing>
+    <p:tnLst>
+      <p:par>
+        <p:cTn id="1" dur="indefinite" restart="never" nodeType="tmRoot"/>
+      </p:par>
+    </p:tnLst>
+  </p:timing>
 </p:sld>
 </file>
 
@@ -7260,6 +7286,13 @@
       </p:transition>
     </mc:Fallback>
   </mc:AlternateContent>
+  <p:timing>
+    <p:tnLst>
+      <p:par>
+        <p:cTn id="1" dur="indefinite" restart="never" nodeType="tmRoot"/>
+      </p:par>
+    </p:tnLst>
+  </p:timing>
 </p:sld>
 </file>
 
@@ -7450,6 +7483,13 @@
       </p:transition>
     </mc:Fallback>
   </mc:AlternateContent>
+  <p:timing>
+    <p:tnLst>
+      <p:par>
+        <p:cTn id="1" dur="indefinite" restart="never" nodeType="tmRoot"/>
+      </p:par>
+    </p:tnLst>
+  </p:timing>
 </p:sld>
 </file>
 
@@ -7640,6 +7680,13 @@
       </p:transition>
     </mc:Fallback>
   </mc:AlternateContent>
+  <p:timing>
+    <p:tnLst>
+      <p:par>
+        <p:cTn id="1" dur="indefinite" restart="never" nodeType="tmRoot"/>
+      </p:par>
+    </p:tnLst>
+  </p:timing>
 </p:sld>
 </file>
 
@@ -7756,8 +7803,17 @@
             </a:pPr>
             <a:r>
               <a:rPr lang="en-US" sz="2000" dirty="0" smtClean="0"/>
-              <a:t>Cannot collide with a beeper</a:t>
-            </a:r>
+              <a:t>Cannot collide with </a:t>
+            </a:r>
+            <a:r>
+              <a:rPr lang="en-US" sz="2000" smtClean="0"/>
+              <a:t>a </a:t>
+            </a:r>
+            <a:r>
+              <a:rPr lang="en-US" sz="2000" smtClean="0"/>
+              <a:t>wall</a:t>
+            </a:r>
+            <a:endParaRPr lang="en-US" sz="2000" dirty="0" smtClean="0"/>
           </a:p>
           <a:p>
             <a:pPr marL="342900" indent="-342900">
@@ -7881,6 +7937,13 @@
       </p:transition>
     </mc:Fallback>
   </mc:AlternateContent>
+  <p:timing>
+    <p:tnLst>
+      <p:par>
+        <p:cTn id="1" dur="indefinite" restart="never" nodeType="tmRoot"/>
+      </p:par>
+    </p:tnLst>
+  </p:timing>
 </p:sld>
 </file>
 
@@ -8089,11 +8152,7 @@
             </a:r>
             <a:r>
               <a:rPr lang="en-US" dirty="0" smtClean="0"/>
-              <a:t> </a:t>
-            </a:r>
-            <a:r>
-              <a:rPr lang="en-US" dirty="0" smtClean="0"/>
-              <a:t>good for navigating a maze</a:t>
+              <a:t> good for navigating a maze</a:t>
             </a:r>
             <a:endParaRPr lang="en-US" dirty="0"/>
           </a:p>
@@ -10787,7 +10846,7 @@
   <a:extraClrSchemeLst/>
   <a:extLst>
     <a:ext uri="{05A4C25C-085E-4340-85A3-A5531E510DB2}">
-      <thm15:themeFamily xmlns="" xmlns:thm15="http://schemas.microsoft.com/office/thememl/2012/main" name="O15_4109default" id="{E728D685-11FC-4812-BA85-57AC6F9C9F40}" vid="{BC4E008B-95FF-4815-904E-143A8EDFC1D4}"/>
+      <thm15:themeFamily xmlns:thm15="http://schemas.microsoft.com/office/thememl/2012/main" xmlns="" name="O15_4109default" id="{E728D685-11FC-4812-BA85-57AC6F9C9F40}" vid="{BC4E008B-95FF-4815-904E-143A8EDFC1D4}"/>
     </a:ext>
   </a:extLst>
 </a:theme>

</xml_diff>